<commit_message>
képek keresése téma kiválasztása linkek összegyűjtése
</commit_message>
<xml_diff>
--- a/Bemutató1.pptx
+++ b/Bemutató1.pptx
@@ -13,8 +13,8 @@
     <p:sldId id="262" r:id="rId7"/>
     <p:sldId id="263" r:id="rId8"/>
     <p:sldId id="264" r:id="rId9"/>
-    <p:sldId id="267" r:id="rId10"/>
-    <p:sldId id="265" r:id="rId11"/>
+    <p:sldId id="265" r:id="rId10"/>
+    <p:sldId id="267" r:id="rId11"/>
     <p:sldId id="266" r:id="rId12"/>
     <p:sldId id="260" r:id="rId13"/>
   </p:sldIdLst>
@@ -115,6 +115,11 @@
       </a:defRPr>
     </a:lvl9pPr>
   </p:defaultTextStyle>
+  <p:extLst>
+    <p:ext uri="{EFAFB233-063F-42B5-8137-9DF3F51BA10A}">
+      <p15:sldGuideLst xmlns:p15="http://schemas.microsoft.com/office/powerpoint/2012/main"/>
+    </p:ext>
+  </p:extLst>
 </p:presentation>
 </file>
 
@@ -364,7 +369,7 @@
             <a:fld id="{B61BEF0D-F0BB-DE4B-95CE-6DB70DBA9567}" type="datetimeFigureOut">
               <a:rPr lang="en-US" dirty="0"/>
               <a:pPr/>
-              <a:t>9/8/2022</a:t>
+              <a:t>9/12/2022</a:t>
             </a:fld>
             <a:endParaRPr lang="en-US" dirty="0"/>
           </a:p>
@@ -623,7 +628,7 @@
             <a:fld id="{B61BEF0D-F0BB-DE4B-95CE-6DB70DBA9567}" type="datetimeFigureOut">
               <a:rPr lang="en-US" dirty="0"/>
               <a:pPr/>
-              <a:t>9/8/2022</a:t>
+              <a:t>9/12/2022</a:t>
             </a:fld>
             <a:endParaRPr lang="en-US" dirty="0"/>
           </a:p>
@@ -855,7 +860,7 @@
             <a:fld id="{B61BEF0D-F0BB-DE4B-95CE-6DB70DBA9567}" type="datetimeFigureOut">
               <a:rPr lang="en-US" dirty="0"/>
               <a:pPr/>
-              <a:t>9/8/2022</a:t>
+              <a:t>9/12/2022</a:t>
             </a:fld>
             <a:endParaRPr lang="en-US" dirty="0"/>
           </a:p>
@@ -1092,7 +1097,7 @@
             <a:fld id="{B61BEF0D-F0BB-DE4B-95CE-6DB70DBA9567}" type="datetimeFigureOut">
               <a:rPr lang="en-US" dirty="0"/>
               <a:pPr/>
-              <a:t>9/8/2022</a:t>
+              <a:t>9/12/2022</a:t>
             </a:fld>
             <a:endParaRPr lang="en-US" dirty="0"/>
           </a:p>
@@ -1396,7 +1401,7 @@
             <a:fld id="{B61BEF0D-F0BB-DE4B-95CE-6DB70DBA9567}" type="datetimeFigureOut">
               <a:rPr lang="en-US" dirty="0"/>
               <a:pPr/>
-              <a:t>9/8/2022</a:t>
+              <a:t>9/12/2022</a:t>
             </a:fld>
             <a:endParaRPr lang="en-US" dirty="0"/>
           </a:p>
@@ -1695,7 +1700,7 @@
             <a:fld id="{B61BEF0D-F0BB-DE4B-95CE-6DB70DBA9567}" type="datetimeFigureOut">
               <a:rPr lang="en-US" dirty="0"/>
               <a:pPr/>
-              <a:t>9/8/2022</a:t>
+              <a:t>9/12/2022</a:t>
             </a:fld>
             <a:endParaRPr lang="en-US" dirty="0"/>
           </a:p>
@@ -2114,7 +2119,7 @@
             <a:fld id="{B61BEF0D-F0BB-DE4B-95CE-6DB70DBA9567}" type="datetimeFigureOut">
               <a:rPr lang="en-US" dirty="0"/>
               <a:pPr/>
-              <a:t>9/8/2022</a:t>
+              <a:t>9/12/2022</a:t>
             </a:fld>
             <a:endParaRPr lang="en-US" dirty="0"/>
           </a:p>
@@ -2273,7 +2278,7 @@
             <a:fld id="{B61BEF0D-F0BB-DE4B-95CE-6DB70DBA9567}" type="datetimeFigureOut">
               <a:rPr lang="en-US" dirty="0"/>
               <a:pPr/>
-              <a:t>9/8/2022</a:t>
+              <a:t>9/12/2022</a:t>
             </a:fld>
             <a:endParaRPr lang="en-US" dirty="0"/>
           </a:p>
@@ -2365,7 +2370,7 @@
             <a:fld id="{B61BEF0D-F0BB-DE4B-95CE-6DB70DBA9567}" type="datetimeFigureOut">
               <a:rPr lang="en-US" dirty="0"/>
               <a:pPr/>
-              <a:t>9/8/2022</a:t>
+              <a:t>9/12/2022</a:t>
             </a:fld>
             <a:endParaRPr lang="en-US" dirty="0"/>
           </a:p>
@@ -2740,7 +2745,7 @@
             <a:fld id="{B61BEF0D-F0BB-DE4B-95CE-6DB70DBA9567}" type="datetimeFigureOut">
               <a:rPr lang="en-US" dirty="0"/>
               <a:pPr/>
-              <a:t>9/8/2022</a:t>
+              <a:t>9/12/2022</a:t>
             </a:fld>
             <a:endParaRPr lang="en-US" dirty="0"/>
           </a:p>
@@ -3026,7 +3031,7 @@
             <a:fld id="{B61BEF0D-F0BB-DE4B-95CE-6DB70DBA9567}" type="datetimeFigureOut">
               <a:rPr lang="en-US" dirty="0"/>
               <a:pPr/>
-              <a:t>9/8/2022</a:t>
+              <a:t>9/12/2022</a:t>
             </a:fld>
             <a:endParaRPr lang="en-US" dirty="0"/>
           </a:p>
@@ -3234,7 +3239,7 @@
             <a:fld id="{B61BEF0D-F0BB-DE4B-95CE-6DB70DBA9567}" type="datetimeFigureOut">
               <a:rPr lang="en-US" dirty="0"/>
               <a:pPr/>
-              <a:t>9/8/2022</a:t>
+              <a:t>9/12/2022</a:t>
             </a:fld>
             <a:endParaRPr lang="en-US" dirty="0"/>
           </a:p>
@@ -3846,6 +3851,10 @@
           <a:bodyPr/>
           <a:lstStyle/>
           <a:p>
+            <a:r>
+              <a:rPr lang="hu-HU" dirty="0" smtClean="0"/>
+              <a:t>Számítógép összeszerelés </a:t>
+            </a:r>
             <a:endParaRPr lang="hu-HU" dirty="0"/>
           </a:p>
         </p:txBody>
@@ -3865,6 +3874,10 @@
           <a:bodyPr/>
           <a:lstStyle/>
           <a:p>
+            <a:r>
+              <a:rPr lang="hu-HU" dirty="0" smtClean="0"/>
+              <a:t>Alkatrészek kiválasztása </a:t>
+            </a:r>
             <a:endParaRPr lang="hu-HU" dirty="0"/>
           </a:p>
         </p:txBody>
@@ -3914,7 +3927,11 @@
           <a:bodyPr/>
           <a:lstStyle/>
           <a:p>
-            <a:endParaRPr lang="hu-HU"/>
+            <a:r>
+              <a:rPr lang="hu-HU" dirty="0" err="1" smtClean="0"/>
+              <a:t>hüttés</a:t>
+            </a:r>
+            <a:endParaRPr lang="hu-HU" dirty="0"/>
           </a:p>
         </p:txBody>
       </p:sp>
@@ -3940,7 +3957,7 @@
     </p:spTree>
     <p:extLst>
       <p:ext uri="{BB962C8B-B14F-4D97-AF65-F5344CB8AC3E}">
-        <p14:creationId xmlns:p14="http://schemas.microsoft.com/office/powerpoint/2010/main" val="4178262707"/>
+        <p14:creationId xmlns:p14="http://schemas.microsoft.com/office/powerpoint/2010/main" val="888304952"/>
       </p:ext>
     </p:extLst>
   </p:cSld>
@@ -3982,7 +3999,11 @@
           <a:bodyPr/>
           <a:lstStyle/>
           <a:p>
-            <a:endParaRPr lang="hu-HU"/>
+            <a:r>
+              <a:rPr lang="hu-HU" dirty="0" smtClean="0"/>
+              <a:t>Operációs rendszer </a:t>
+            </a:r>
+            <a:endParaRPr lang="hu-HU" dirty="0"/>
           </a:p>
         </p:txBody>
       </p:sp>
@@ -4141,7 +4162,11 @@
           <a:bodyPr/>
           <a:lstStyle/>
           <a:p>
-            <a:endParaRPr lang="hu-HU"/>
+            <a:r>
+              <a:rPr lang="hu-HU" dirty="0" smtClean="0"/>
+              <a:t>Használási cél </a:t>
+            </a:r>
+            <a:endParaRPr lang="hu-HU" dirty="0"/>
           </a:p>
         </p:txBody>
       </p:sp>
@@ -4160,7 +4185,7 @@
           <a:bodyPr/>
           <a:lstStyle/>
           <a:p>
-            <a:endParaRPr lang="hu-HU"/>
+            <a:endParaRPr lang="hu-HU" dirty="0"/>
           </a:p>
         </p:txBody>
       </p:sp>
@@ -4209,7 +4234,11 @@
           <a:bodyPr/>
           <a:lstStyle/>
           <a:p>
-            <a:endParaRPr lang="hu-HU"/>
+            <a:r>
+              <a:rPr lang="hu-HU" dirty="0" smtClean="0"/>
+              <a:t>Processzor</a:t>
+            </a:r>
+            <a:endParaRPr lang="hu-HU" dirty="0"/>
           </a:p>
         </p:txBody>
       </p:sp>
@@ -4228,7 +4257,7 @@
           <a:bodyPr/>
           <a:lstStyle/>
           <a:p>
-            <a:endParaRPr lang="hu-HU"/>
+            <a:endParaRPr lang="hu-HU" dirty="0"/>
           </a:p>
         </p:txBody>
       </p:sp>
@@ -4277,7 +4306,11 @@
           <a:bodyPr/>
           <a:lstStyle/>
           <a:p>
-            <a:endParaRPr lang="hu-HU"/>
+            <a:r>
+              <a:rPr lang="hu-HU" dirty="0" smtClean="0"/>
+              <a:t>alaplap</a:t>
+            </a:r>
+            <a:endParaRPr lang="hu-HU" dirty="0"/>
           </a:p>
         </p:txBody>
       </p:sp>
@@ -4345,7 +4378,11 @@
           <a:bodyPr/>
           <a:lstStyle/>
           <a:p>
-            <a:endParaRPr lang="hu-HU"/>
+            <a:r>
+              <a:rPr lang="hu-HU" dirty="0" smtClean="0"/>
+              <a:t>videokártya</a:t>
+            </a:r>
+            <a:endParaRPr lang="hu-HU" dirty="0"/>
           </a:p>
         </p:txBody>
       </p:sp>
@@ -4413,7 +4450,11 @@
           <a:bodyPr/>
           <a:lstStyle/>
           <a:p>
-            <a:endParaRPr lang="hu-HU"/>
+            <a:r>
+              <a:rPr lang="hu-HU" dirty="0" smtClean="0"/>
+              <a:t>RAM</a:t>
+            </a:r>
+            <a:endParaRPr lang="hu-HU" dirty="0"/>
           </a:p>
         </p:txBody>
       </p:sp>
@@ -4481,7 +4522,11 @@
           <a:bodyPr/>
           <a:lstStyle/>
           <a:p>
-            <a:endParaRPr lang="hu-HU"/>
+            <a:r>
+              <a:rPr lang="hu-HU" dirty="0" smtClean="0"/>
+              <a:t>háttértár</a:t>
+            </a:r>
+            <a:endParaRPr lang="hu-HU" dirty="0"/>
           </a:p>
         </p:txBody>
       </p:sp>
@@ -4549,7 +4594,11 @@
           <a:bodyPr/>
           <a:lstStyle/>
           <a:p>
-            <a:endParaRPr lang="hu-HU"/>
+            <a:r>
+              <a:rPr lang="hu-HU" dirty="0" smtClean="0"/>
+              <a:t>tápegység</a:t>
+            </a:r>
+            <a:endParaRPr lang="hu-HU" dirty="0"/>
           </a:p>
         </p:txBody>
       </p:sp>
@@ -4617,7 +4666,11 @@
           <a:bodyPr/>
           <a:lstStyle/>
           <a:p>
-            <a:endParaRPr lang="hu-HU"/>
+            <a:r>
+              <a:rPr lang="hu-HU" dirty="0" err="1" smtClean="0"/>
+              <a:t>Hépkáz</a:t>
+            </a:r>
+            <a:endParaRPr lang="hu-HU" dirty="0"/>
           </a:p>
         </p:txBody>
       </p:sp>
@@ -4643,7 +4696,7 @@
     </p:spTree>
     <p:extLst>
       <p:ext uri="{BB962C8B-B14F-4D97-AF65-F5344CB8AC3E}">
-        <p14:creationId xmlns:p14="http://schemas.microsoft.com/office/powerpoint/2010/main" val="888304952"/>
+        <p14:creationId xmlns:p14="http://schemas.microsoft.com/office/powerpoint/2010/main" val="4178262707"/>
       </p:ext>
     </p:extLst>
   </p:cSld>

</xml_diff>